<commit_message>
Finish timing for now
</commit_message>
<xml_diff>
--- a/img/taxonomy_with_oracle.pptx
+++ b/img/taxonomy_with_oracle.pptx
@@ -243,7 +243,7 @@
           <a:p>
             <a:fld id="{C26389DF-7C87-4F65-9868-559F2AC6CA20}" type="datetimeFigureOut">
               <a:rPr lang="en-US" smtClean="0"/>
-              <a:t>3/3/2023</a:t>
+              <a:t>3/16/2023</a:t>
             </a:fld>
             <a:endParaRPr lang="en-US"/>
           </a:p>
@@ -413,7 +413,7 @@
           <a:p>
             <a:fld id="{C26389DF-7C87-4F65-9868-559F2AC6CA20}" type="datetimeFigureOut">
               <a:rPr lang="en-US" smtClean="0"/>
-              <a:t>3/3/2023</a:t>
+              <a:t>3/16/2023</a:t>
             </a:fld>
             <a:endParaRPr lang="en-US"/>
           </a:p>
@@ -593,7 +593,7 @@
           <a:p>
             <a:fld id="{C26389DF-7C87-4F65-9868-559F2AC6CA20}" type="datetimeFigureOut">
               <a:rPr lang="en-US" smtClean="0"/>
-              <a:t>3/3/2023</a:t>
+              <a:t>3/16/2023</a:t>
             </a:fld>
             <a:endParaRPr lang="en-US"/>
           </a:p>
@@ -763,7 +763,7 @@
           <a:p>
             <a:fld id="{C26389DF-7C87-4F65-9868-559F2AC6CA20}" type="datetimeFigureOut">
               <a:rPr lang="en-US" smtClean="0"/>
-              <a:t>3/3/2023</a:t>
+              <a:t>3/16/2023</a:t>
             </a:fld>
             <a:endParaRPr lang="en-US"/>
           </a:p>
@@ -1009,7 +1009,7 @@
           <a:p>
             <a:fld id="{C26389DF-7C87-4F65-9868-559F2AC6CA20}" type="datetimeFigureOut">
               <a:rPr lang="en-US" smtClean="0"/>
-              <a:t>3/3/2023</a:t>
+              <a:t>3/16/2023</a:t>
             </a:fld>
             <a:endParaRPr lang="en-US"/>
           </a:p>
@@ -1241,7 +1241,7 @@
           <a:p>
             <a:fld id="{C26389DF-7C87-4F65-9868-559F2AC6CA20}" type="datetimeFigureOut">
               <a:rPr lang="en-US" smtClean="0"/>
-              <a:t>3/3/2023</a:t>
+              <a:t>3/16/2023</a:t>
             </a:fld>
             <a:endParaRPr lang="en-US"/>
           </a:p>
@@ -1608,7 +1608,7 @@
           <a:p>
             <a:fld id="{C26389DF-7C87-4F65-9868-559F2AC6CA20}" type="datetimeFigureOut">
               <a:rPr lang="en-US" smtClean="0"/>
-              <a:t>3/3/2023</a:t>
+              <a:t>3/16/2023</a:t>
             </a:fld>
             <a:endParaRPr lang="en-US"/>
           </a:p>
@@ -1726,7 +1726,7 @@
           <a:p>
             <a:fld id="{C26389DF-7C87-4F65-9868-559F2AC6CA20}" type="datetimeFigureOut">
               <a:rPr lang="en-US" smtClean="0"/>
-              <a:t>3/3/2023</a:t>
+              <a:t>3/16/2023</a:t>
             </a:fld>
             <a:endParaRPr lang="en-US"/>
           </a:p>
@@ -1821,7 +1821,7 @@
           <a:p>
             <a:fld id="{C26389DF-7C87-4F65-9868-559F2AC6CA20}" type="datetimeFigureOut">
               <a:rPr lang="en-US" smtClean="0"/>
-              <a:t>3/3/2023</a:t>
+              <a:t>3/16/2023</a:t>
             </a:fld>
             <a:endParaRPr lang="en-US"/>
           </a:p>
@@ -2098,7 +2098,7 @@
           <a:p>
             <a:fld id="{C26389DF-7C87-4F65-9868-559F2AC6CA20}" type="datetimeFigureOut">
               <a:rPr lang="en-US" smtClean="0"/>
-              <a:t>3/3/2023</a:t>
+              <a:t>3/16/2023</a:t>
             </a:fld>
             <a:endParaRPr lang="en-US"/>
           </a:p>
@@ -2355,7 +2355,7 @@
           <a:p>
             <a:fld id="{C26389DF-7C87-4F65-9868-559F2AC6CA20}" type="datetimeFigureOut">
               <a:rPr lang="en-US" smtClean="0"/>
-              <a:t>3/3/2023</a:t>
+              <a:t>3/16/2023</a:t>
             </a:fld>
             <a:endParaRPr lang="en-US"/>
           </a:p>
@@ -2568,7 +2568,7 @@
           <a:p>
             <a:fld id="{C26389DF-7C87-4F65-9868-559F2AC6CA20}" type="datetimeFigureOut">
               <a:rPr lang="en-US" smtClean="0"/>
-              <a:t>3/3/2023</a:t>
+              <a:t>3/16/2023</a:t>
             </a:fld>
             <a:endParaRPr lang="en-US"/>
           </a:p>
@@ -3234,7 +3234,9 @@
           <a:noFill/>
           <a:ln w="12700">
             <a:solidFill>
-              <a:schemeClr val="tx1"/>
+              <a:schemeClr val="accent6">
+                <a:lumMod val="50000"/>
+              </a:schemeClr>
             </a:solidFill>
           </a:ln>
         </p:spPr>
@@ -3269,7 +3271,27 @@
                 <a:latin typeface="Times New Roman" panose="02020603050405020304" pitchFamily="18" charset="0"/>
                 <a:cs typeface="Times New Roman" panose="02020603050405020304" pitchFamily="18" charset="0"/>
               </a:rPr>
-              <a:t>Reference System</a:t>
+              <a:t>Reference System (</a:t>
+            </a:r>
+            <a:r>
+              <a:rPr lang="de-DE" sz="999" dirty="0" err="1">
+                <a:solidFill>
+                  <a:schemeClr val="tx1"/>
+                </a:solidFill>
+                <a:latin typeface="Times New Roman" panose="02020603050405020304" pitchFamily="18" charset="0"/>
+                <a:cs typeface="Times New Roman" panose="02020603050405020304" pitchFamily="18" charset="0"/>
+              </a:rPr>
+              <a:t>ReS</a:t>
+            </a:r>
+            <a:r>
+              <a:rPr lang="de-DE" sz="999" dirty="0">
+                <a:solidFill>
+                  <a:schemeClr val="tx1"/>
+                </a:solidFill>
+                <a:latin typeface="Times New Roman" panose="02020603050405020304" pitchFamily="18" charset="0"/>
+                <a:cs typeface="Times New Roman" panose="02020603050405020304" pitchFamily="18" charset="0"/>
+              </a:rPr>
+              <a:t>)</a:t>
             </a:r>
           </a:p>
         </p:txBody>
@@ -3291,7 +3313,9 @@
           <a:noFill/>
           <a:ln w="12700">
             <a:solidFill>
-              <a:schemeClr val="tx1"/>
+              <a:schemeClr val="accent2">
+                <a:lumMod val="75000"/>
+              </a:schemeClr>
             </a:solidFill>
           </a:ln>
         </p:spPr>
@@ -3356,7 +3380,27 @@
                 <a:latin typeface="Times New Roman" panose="02020603050405020304" pitchFamily="18" charset="0"/>
                 <a:cs typeface="Times New Roman" panose="02020603050405020304" pitchFamily="18" charset="0"/>
               </a:rPr>
-              <a:t> Test</a:t>
+              <a:t> Test (</a:t>
+            </a:r>
+            <a:r>
+              <a:rPr lang="de-DE" sz="999" dirty="0" err="1">
+                <a:solidFill>
+                  <a:schemeClr val="tx1"/>
+                </a:solidFill>
+                <a:latin typeface="Times New Roman" panose="02020603050405020304" pitchFamily="18" charset="0"/>
+                <a:cs typeface="Times New Roman" panose="02020603050405020304" pitchFamily="18" charset="0"/>
+              </a:rPr>
+              <a:t>OuT</a:t>
+            </a:r>
+            <a:r>
+              <a:rPr lang="de-DE" sz="999" dirty="0">
+                <a:solidFill>
+                  <a:schemeClr val="tx1"/>
+                </a:solidFill>
+                <a:latin typeface="Times New Roman" panose="02020603050405020304" pitchFamily="18" charset="0"/>
+                <a:cs typeface="Times New Roman" panose="02020603050405020304" pitchFamily="18" charset="0"/>
+              </a:rPr>
+              <a:t>)</a:t>
             </a:r>
           </a:p>
         </p:txBody>
@@ -3662,8 +3706,8 @@
         </p:nvSpPr>
         <p:spPr>
           <a:xfrm>
-            <a:off x="1041192" y="610032"/>
-            <a:ext cx="1115268" cy="338554"/>
+            <a:off x="893765" y="760539"/>
+            <a:ext cx="1292268" cy="338554"/>
           </a:xfrm>
           <a:prstGeom prst="rect">
             <a:avLst/>
@@ -3688,8 +3732,8 @@
               </a:rPr>
               <a:t>HW, SW, ML, </a:t>
             </a:r>
-            <a:br>
-              <a:rPr lang="de-DE" sz="800" dirty="0">
+            <a:r>
+              <a:rPr lang="de-DE" sz="800" dirty="0" err="1">
                 <a:solidFill>
                   <a:schemeClr val="accent1">
                     <a:lumMod val="75000"/>
@@ -3698,30 +3742,7 @@
                 <a:latin typeface="Times New Roman" panose="02020603050405020304" pitchFamily="18" charset="0"/>
                 <a:cs typeface="Times New Roman" panose="02020603050405020304" pitchFamily="18" charset="0"/>
               </a:rPr>
-            </a:br>
-            <a:r>
-              <a:rPr lang="de-DE" sz="800" dirty="0">
-                <a:solidFill>
-                  <a:schemeClr val="accent1">
-                    <a:lumMod val="75000"/>
-                  </a:schemeClr>
-                </a:solidFill>
-                <a:latin typeface="Times New Roman" panose="02020603050405020304" pitchFamily="18" charset="0"/>
-                <a:cs typeface="Times New Roman" panose="02020603050405020304" pitchFamily="18" charset="0"/>
-              </a:rPr>
-              <a:t>human </a:t>
-            </a:r>
-            <a:r>
-              <a:rPr lang="de-DE" sz="800" dirty="0" err="1">
-                <a:solidFill>
-                  <a:schemeClr val="accent1">
-                    <a:lumMod val="75000"/>
-                  </a:schemeClr>
-                </a:solidFill>
-                <a:latin typeface="Times New Roman" panose="02020603050405020304" pitchFamily="18" charset="0"/>
-                <a:cs typeface="Times New Roman" panose="02020603050405020304" pitchFamily="18" charset="0"/>
-              </a:rPr>
-              <a:t>aspects</a:t>
+              <a:t>Humans</a:t>
             </a:r>
             <a:endParaRPr lang="en-US" sz="800" dirty="0">
               <a:solidFill>

</xml_diff>

<commit_message>
minor improvements and fixes in taxonomy graphic
</commit_message>
<xml_diff>
--- a/img/taxonomy_with_oracle.pptx
+++ b/img/taxonomy_with_oracle.pptx
@@ -243,9 +243,9 @@
           <a:p>
             <a:fld id="{C26389DF-7C87-4F65-9868-559F2AC6CA20}" type="datetimeFigureOut">
               <a:rPr lang="en-US" smtClean="0"/>
-              <a:t>3/16/2023</a:t>
+              <a:t>5/15/2023</a:t>
             </a:fld>
-            <a:endParaRPr lang="en-US"/>
+            <a:endParaRPr lang="en-US" dirty="0"/>
           </a:p>
         </p:txBody>
       </p:sp>
@@ -264,7 +264,7 @@
           <a:bodyPr/>
           <a:lstStyle/>
           <a:p>
-            <a:endParaRPr lang="en-US"/>
+            <a:endParaRPr lang="en-US" dirty="0"/>
           </a:p>
         </p:txBody>
       </p:sp>
@@ -287,7 +287,7 @@
               <a:rPr lang="en-US" smtClean="0"/>
               <a:t>‹#›</a:t>
             </a:fld>
-            <a:endParaRPr lang="en-US"/>
+            <a:endParaRPr lang="en-US" dirty="0"/>
           </a:p>
         </p:txBody>
       </p:sp>
@@ -413,9 +413,9 @@
           <a:p>
             <a:fld id="{C26389DF-7C87-4F65-9868-559F2AC6CA20}" type="datetimeFigureOut">
               <a:rPr lang="en-US" smtClean="0"/>
-              <a:t>3/16/2023</a:t>
+              <a:t>5/15/2023</a:t>
             </a:fld>
-            <a:endParaRPr lang="en-US"/>
+            <a:endParaRPr lang="en-US" dirty="0"/>
           </a:p>
         </p:txBody>
       </p:sp>
@@ -434,7 +434,7 @@
           <a:bodyPr/>
           <a:lstStyle/>
           <a:p>
-            <a:endParaRPr lang="en-US"/>
+            <a:endParaRPr lang="en-US" dirty="0"/>
           </a:p>
         </p:txBody>
       </p:sp>
@@ -457,7 +457,7 @@
               <a:rPr lang="en-US" smtClean="0"/>
               <a:t>‹#›</a:t>
             </a:fld>
-            <a:endParaRPr lang="en-US"/>
+            <a:endParaRPr lang="en-US" dirty="0"/>
           </a:p>
         </p:txBody>
       </p:sp>
@@ -593,9 +593,9 @@
           <a:p>
             <a:fld id="{C26389DF-7C87-4F65-9868-559F2AC6CA20}" type="datetimeFigureOut">
               <a:rPr lang="en-US" smtClean="0"/>
-              <a:t>3/16/2023</a:t>
+              <a:t>5/15/2023</a:t>
             </a:fld>
-            <a:endParaRPr lang="en-US"/>
+            <a:endParaRPr lang="en-US" dirty="0"/>
           </a:p>
         </p:txBody>
       </p:sp>
@@ -614,7 +614,7 @@
           <a:bodyPr/>
           <a:lstStyle/>
           <a:p>
-            <a:endParaRPr lang="en-US"/>
+            <a:endParaRPr lang="en-US" dirty="0"/>
           </a:p>
         </p:txBody>
       </p:sp>
@@ -637,7 +637,7 @@
               <a:rPr lang="en-US" smtClean="0"/>
               <a:t>‹#›</a:t>
             </a:fld>
-            <a:endParaRPr lang="en-US"/>
+            <a:endParaRPr lang="en-US" dirty="0"/>
           </a:p>
         </p:txBody>
       </p:sp>
@@ -763,9 +763,9 @@
           <a:p>
             <a:fld id="{C26389DF-7C87-4F65-9868-559F2AC6CA20}" type="datetimeFigureOut">
               <a:rPr lang="en-US" smtClean="0"/>
-              <a:t>3/16/2023</a:t>
+              <a:t>5/15/2023</a:t>
             </a:fld>
-            <a:endParaRPr lang="en-US"/>
+            <a:endParaRPr lang="en-US" dirty="0"/>
           </a:p>
         </p:txBody>
       </p:sp>
@@ -784,7 +784,7 @@
           <a:bodyPr/>
           <a:lstStyle/>
           <a:p>
-            <a:endParaRPr lang="en-US"/>
+            <a:endParaRPr lang="en-US" dirty="0"/>
           </a:p>
         </p:txBody>
       </p:sp>
@@ -807,7 +807,7 @@
               <a:rPr lang="en-US" smtClean="0"/>
               <a:t>‹#›</a:t>
             </a:fld>
-            <a:endParaRPr lang="en-US"/>
+            <a:endParaRPr lang="en-US" dirty="0"/>
           </a:p>
         </p:txBody>
       </p:sp>
@@ -1009,9 +1009,9 @@
           <a:p>
             <a:fld id="{C26389DF-7C87-4F65-9868-559F2AC6CA20}" type="datetimeFigureOut">
               <a:rPr lang="en-US" smtClean="0"/>
-              <a:t>3/16/2023</a:t>
+              <a:t>5/15/2023</a:t>
             </a:fld>
-            <a:endParaRPr lang="en-US"/>
+            <a:endParaRPr lang="en-US" dirty="0"/>
           </a:p>
         </p:txBody>
       </p:sp>
@@ -1030,7 +1030,7 @@
           <a:bodyPr/>
           <a:lstStyle/>
           <a:p>
-            <a:endParaRPr lang="en-US"/>
+            <a:endParaRPr lang="en-US" dirty="0"/>
           </a:p>
         </p:txBody>
       </p:sp>
@@ -1053,7 +1053,7 @@
               <a:rPr lang="en-US" smtClean="0"/>
               <a:t>‹#›</a:t>
             </a:fld>
-            <a:endParaRPr lang="en-US"/>
+            <a:endParaRPr lang="en-US" dirty="0"/>
           </a:p>
         </p:txBody>
       </p:sp>
@@ -1241,9 +1241,9 @@
           <a:p>
             <a:fld id="{C26389DF-7C87-4F65-9868-559F2AC6CA20}" type="datetimeFigureOut">
               <a:rPr lang="en-US" smtClean="0"/>
-              <a:t>3/16/2023</a:t>
+              <a:t>5/15/2023</a:t>
             </a:fld>
-            <a:endParaRPr lang="en-US"/>
+            <a:endParaRPr lang="en-US" dirty="0"/>
           </a:p>
         </p:txBody>
       </p:sp>
@@ -1262,7 +1262,7 @@
           <a:bodyPr/>
           <a:lstStyle/>
           <a:p>
-            <a:endParaRPr lang="en-US"/>
+            <a:endParaRPr lang="en-US" dirty="0"/>
           </a:p>
         </p:txBody>
       </p:sp>
@@ -1285,7 +1285,7 @@
               <a:rPr lang="en-US" smtClean="0"/>
               <a:t>‹#›</a:t>
             </a:fld>
-            <a:endParaRPr lang="en-US"/>
+            <a:endParaRPr lang="en-US" dirty="0"/>
           </a:p>
         </p:txBody>
       </p:sp>
@@ -1608,9 +1608,9 @@
           <a:p>
             <a:fld id="{C26389DF-7C87-4F65-9868-559F2AC6CA20}" type="datetimeFigureOut">
               <a:rPr lang="en-US" smtClean="0"/>
-              <a:t>3/16/2023</a:t>
+              <a:t>5/15/2023</a:t>
             </a:fld>
-            <a:endParaRPr lang="en-US"/>
+            <a:endParaRPr lang="en-US" dirty="0"/>
           </a:p>
         </p:txBody>
       </p:sp>
@@ -1629,7 +1629,7 @@
           <a:bodyPr/>
           <a:lstStyle/>
           <a:p>
-            <a:endParaRPr lang="en-US"/>
+            <a:endParaRPr lang="en-US" dirty="0"/>
           </a:p>
         </p:txBody>
       </p:sp>
@@ -1652,7 +1652,7 @@
               <a:rPr lang="en-US" smtClean="0"/>
               <a:t>‹#›</a:t>
             </a:fld>
-            <a:endParaRPr lang="en-US"/>
+            <a:endParaRPr lang="en-US" dirty="0"/>
           </a:p>
         </p:txBody>
       </p:sp>
@@ -1726,9 +1726,9 @@
           <a:p>
             <a:fld id="{C26389DF-7C87-4F65-9868-559F2AC6CA20}" type="datetimeFigureOut">
               <a:rPr lang="en-US" smtClean="0"/>
-              <a:t>3/16/2023</a:t>
+              <a:t>5/15/2023</a:t>
             </a:fld>
-            <a:endParaRPr lang="en-US"/>
+            <a:endParaRPr lang="en-US" dirty="0"/>
           </a:p>
         </p:txBody>
       </p:sp>
@@ -1747,7 +1747,7 @@
           <a:bodyPr/>
           <a:lstStyle/>
           <a:p>
-            <a:endParaRPr lang="en-US"/>
+            <a:endParaRPr lang="en-US" dirty="0"/>
           </a:p>
         </p:txBody>
       </p:sp>
@@ -1770,7 +1770,7 @@
               <a:rPr lang="en-US" smtClean="0"/>
               <a:t>‹#›</a:t>
             </a:fld>
-            <a:endParaRPr lang="en-US"/>
+            <a:endParaRPr lang="en-US" dirty="0"/>
           </a:p>
         </p:txBody>
       </p:sp>
@@ -1821,9 +1821,9 @@
           <a:p>
             <a:fld id="{C26389DF-7C87-4F65-9868-559F2AC6CA20}" type="datetimeFigureOut">
               <a:rPr lang="en-US" smtClean="0"/>
-              <a:t>3/16/2023</a:t>
+              <a:t>5/15/2023</a:t>
             </a:fld>
-            <a:endParaRPr lang="en-US"/>
+            <a:endParaRPr lang="en-US" dirty="0"/>
           </a:p>
         </p:txBody>
       </p:sp>
@@ -1842,7 +1842,7 @@
           <a:bodyPr/>
           <a:lstStyle/>
           <a:p>
-            <a:endParaRPr lang="en-US"/>
+            <a:endParaRPr lang="en-US" dirty="0"/>
           </a:p>
         </p:txBody>
       </p:sp>
@@ -1865,7 +1865,7 @@
               <a:rPr lang="en-US" smtClean="0"/>
               <a:t>‹#›</a:t>
             </a:fld>
-            <a:endParaRPr lang="en-US"/>
+            <a:endParaRPr lang="en-US" dirty="0"/>
           </a:p>
         </p:txBody>
       </p:sp>
@@ -2098,9 +2098,9 @@
           <a:p>
             <a:fld id="{C26389DF-7C87-4F65-9868-559F2AC6CA20}" type="datetimeFigureOut">
               <a:rPr lang="en-US" smtClean="0"/>
-              <a:t>3/16/2023</a:t>
+              <a:t>5/15/2023</a:t>
             </a:fld>
-            <a:endParaRPr lang="en-US"/>
+            <a:endParaRPr lang="en-US" dirty="0"/>
           </a:p>
         </p:txBody>
       </p:sp>
@@ -2119,7 +2119,7 @@
           <a:bodyPr/>
           <a:lstStyle/>
           <a:p>
-            <a:endParaRPr lang="en-US"/>
+            <a:endParaRPr lang="en-US" dirty="0"/>
           </a:p>
         </p:txBody>
       </p:sp>
@@ -2142,7 +2142,7 @@
               <a:rPr lang="en-US" smtClean="0"/>
               <a:t>‹#›</a:t>
             </a:fld>
-            <a:endParaRPr lang="en-US"/>
+            <a:endParaRPr lang="en-US" dirty="0"/>
           </a:p>
         </p:txBody>
       </p:sp>
@@ -2266,10 +2266,9 @@
           </a:lstStyle>
           <a:p>
             <a:r>
-              <a:rPr lang="en-US"/>
+              <a:rPr lang="en-US" dirty="0"/>
               <a:t>Click icon to add picture</a:t>
             </a:r>
-            <a:endParaRPr lang="en-US" dirty="0"/>
           </a:p>
         </p:txBody>
       </p:sp>
@@ -2355,9 +2354,9 @@
           <a:p>
             <a:fld id="{C26389DF-7C87-4F65-9868-559F2AC6CA20}" type="datetimeFigureOut">
               <a:rPr lang="en-US" smtClean="0"/>
-              <a:t>3/16/2023</a:t>
+              <a:t>5/15/2023</a:t>
             </a:fld>
-            <a:endParaRPr lang="en-US"/>
+            <a:endParaRPr lang="en-US" dirty="0"/>
           </a:p>
         </p:txBody>
       </p:sp>
@@ -2376,7 +2375,7 @@
           <a:bodyPr/>
           <a:lstStyle/>
           <a:p>
-            <a:endParaRPr lang="en-US"/>
+            <a:endParaRPr lang="en-US" dirty="0"/>
           </a:p>
         </p:txBody>
       </p:sp>
@@ -2399,7 +2398,7 @@
               <a:rPr lang="en-US" smtClean="0"/>
               <a:t>‹#›</a:t>
             </a:fld>
-            <a:endParaRPr lang="en-US"/>
+            <a:endParaRPr lang="en-US" dirty="0"/>
           </a:p>
         </p:txBody>
       </p:sp>
@@ -2568,9 +2567,9 @@
           <a:p>
             <a:fld id="{C26389DF-7C87-4F65-9868-559F2AC6CA20}" type="datetimeFigureOut">
               <a:rPr lang="en-US" smtClean="0"/>
-              <a:t>3/16/2023</a:t>
+              <a:t>5/15/2023</a:t>
             </a:fld>
-            <a:endParaRPr lang="en-US"/>
+            <a:endParaRPr lang="en-US" dirty="0"/>
           </a:p>
         </p:txBody>
       </p:sp>
@@ -2607,7 +2606,7 @@
             </a:lvl1pPr>
           </a:lstStyle>
           <a:p>
-            <a:endParaRPr lang="en-US"/>
+            <a:endParaRPr lang="en-US" dirty="0"/>
           </a:p>
         </p:txBody>
       </p:sp>
@@ -2648,7 +2647,7 @@
               <a:rPr lang="en-US" smtClean="0"/>
               <a:t>‹#›</a:t>
             </a:fld>
-            <a:endParaRPr lang="en-US"/>
+            <a:endParaRPr lang="en-US" dirty="0"/>
           </a:p>
         </p:txBody>
       </p:sp>
@@ -3274,7 +3273,7 @@
               <a:t>Reference System (</a:t>
             </a:r>
             <a:r>
-              <a:rPr lang="de-DE" sz="999" dirty="0" err="1">
+              <a:rPr lang="en-US" sz="999" dirty="0" err="1">
                 <a:solidFill>
                   <a:schemeClr val="tx1"/>
                 </a:solidFill>
@@ -3579,7 +3578,7 @@
           <a:lstStyle/>
           <a:p>
             <a:r>
-              <a:rPr lang="de-DE" sz="800" dirty="0">
+              <a:rPr lang="de-DE" sz="800" dirty="0" err="1">
                 <a:solidFill>
                   <a:schemeClr val="accent1">
                     <a:lumMod val="75000"/>
@@ -3588,7 +3587,7 @@
                 <a:latin typeface="Times New Roman" panose="02020603050405020304" pitchFamily="18" charset="0"/>
                 <a:cs typeface="Times New Roman" panose="02020603050405020304" pitchFamily="18" charset="0"/>
               </a:rPr>
-              <a:t>FOV</a:t>
+              <a:t>FoV</a:t>
             </a:r>
             <a:endParaRPr lang="en-US" sz="800" dirty="0">
               <a:solidFill>
@@ -3768,8 +3767,8 @@
         </p:nvSpPr>
         <p:spPr>
           <a:xfrm>
-            <a:off x="3253884" y="759252"/>
-            <a:ext cx="778730" cy="770253"/>
+            <a:off x="3427611" y="759252"/>
+            <a:ext cx="678154" cy="770253"/>
           </a:xfrm>
           <a:prstGeom prst="rect">
             <a:avLst/>
@@ -3859,7 +3858,7 @@
                 <a:latin typeface="Times New Roman" panose="02020603050405020304" pitchFamily="18" charset="0"/>
                 <a:cs typeface="Times New Roman" panose="02020603050405020304" pitchFamily="18" charset="0"/>
               </a:rPr>
-              <a:t>,</a:t>
+              <a:t>;</a:t>
             </a:r>
             <a:br>
               <a:rPr lang="de-DE" sz="800" dirty="0">
@@ -4028,8 +4027,8 @@
         </p:nvSpPr>
         <p:spPr>
           <a:xfrm>
-            <a:off x="4090561" y="758244"/>
-            <a:ext cx="811840" cy="770253"/>
+            <a:off x="4177791" y="758244"/>
+            <a:ext cx="724609" cy="770253"/>
           </a:xfrm>
           <a:prstGeom prst="rect">
             <a:avLst/>
@@ -4059,7 +4058,7 @@
                 <a:latin typeface="Times New Roman" panose="02020603050405020304" pitchFamily="18" charset="0"/>
                 <a:cs typeface="Times New Roman" panose="02020603050405020304" pitchFamily="18" charset="0"/>
               </a:rPr>
-              <a:t>Filter semantic areas /no-test areas; </a:t>
+              <a:t>Filter relevant areas areas; </a:t>
             </a:r>
             <a:br>
               <a:rPr lang="en-US" sz="800" dirty="0">
@@ -4283,8 +4282,8 @@
         </p:nvSpPr>
         <p:spPr>
           <a:xfrm>
-            <a:off x="2562824" y="755493"/>
-            <a:ext cx="633113" cy="773006"/>
+            <a:off x="2562823" y="755493"/>
+            <a:ext cx="789670" cy="773006"/>
           </a:xfrm>
           <a:prstGeom prst="rect">
             <a:avLst/>
@@ -4326,7 +4325,7 @@
                 <a:latin typeface="Times New Roman" panose="02020603050405020304" pitchFamily="18" charset="0"/>
                 <a:cs typeface="Times New Roman" panose="02020603050405020304" pitchFamily="18" charset="0"/>
               </a:rPr>
-              <a:t>sync</a:t>
+              <a:t>synchronization</a:t>
             </a:r>
             <a:r>
               <a:rPr lang="de-DE" sz="800" dirty="0">
@@ -4338,7 +4337,7 @@
                 <a:latin typeface="Times New Roman" panose="02020603050405020304" pitchFamily="18" charset="0"/>
                 <a:cs typeface="Times New Roman" panose="02020603050405020304" pitchFamily="18" charset="0"/>
               </a:rPr>
-              <a:t>.; Common </a:t>
+              <a:t>; Common </a:t>
             </a:r>
             <a:r>
               <a:rPr lang="de-DE" sz="800" dirty="0" err="1">
@@ -4350,7 +4349,7 @@
                 <a:latin typeface="Times New Roman" panose="02020603050405020304" pitchFamily="18" charset="0"/>
                 <a:cs typeface="Times New Roman" panose="02020603050405020304" pitchFamily="18" charset="0"/>
               </a:rPr>
-              <a:t>coord</a:t>
+              <a:t>coordinate</a:t>
             </a:r>
             <a:r>
               <a:rPr lang="de-DE" sz="800" dirty="0">
@@ -4362,7 +4361,7 @@
                 <a:latin typeface="Times New Roman" panose="02020603050405020304" pitchFamily="18" charset="0"/>
                 <a:cs typeface="Times New Roman" panose="02020603050405020304" pitchFamily="18" charset="0"/>
               </a:rPr>
-              <a:t>. </a:t>
+              <a:t> </a:t>
             </a:r>
             <a:r>
               <a:rPr lang="de-DE" sz="800" dirty="0" err="1">
@@ -4414,8 +4413,8 @@
         </p:nvCxnSpPr>
         <p:spPr>
           <a:xfrm>
-            <a:off x="4902401" y="1143371"/>
-            <a:ext cx="240268" cy="0"/>
+            <a:off x="4902400" y="1143371"/>
+            <a:ext cx="240269" cy="0"/>
           </a:xfrm>
           <a:prstGeom prst="straightConnector1">
             <a:avLst/>

</xml_diff>

<commit_message>
Implement Robert's feedback in taxonomy figure
</commit_message>
<xml_diff>
--- a/img/taxonomy_with_oracle.pptx
+++ b/img/taxonomy_with_oracle.pptx
@@ -243,7 +243,7 @@
           <a:p>
             <a:fld id="{C26389DF-7C87-4F65-9868-559F2AC6CA20}" type="datetimeFigureOut">
               <a:rPr lang="en-US" smtClean="0"/>
-              <a:t>5/15/2023</a:t>
+              <a:t>10/4/2023</a:t>
             </a:fld>
             <a:endParaRPr lang="en-US" dirty="0"/>
           </a:p>
@@ -413,7 +413,7 @@
           <a:p>
             <a:fld id="{C26389DF-7C87-4F65-9868-559F2AC6CA20}" type="datetimeFigureOut">
               <a:rPr lang="en-US" smtClean="0"/>
-              <a:t>5/15/2023</a:t>
+              <a:t>10/4/2023</a:t>
             </a:fld>
             <a:endParaRPr lang="en-US" dirty="0"/>
           </a:p>
@@ -593,7 +593,7 @@
           <a:p>
             <a:fld id="{C26389DF-7C87-4F65-9868-559F2AC6CA20}" type="datetimeFigureOut">
               <a:rPr lang="en-US" smtClean="0"/>
-              <a:t>5/15/2023</a:t>
+              <a:t>10/4/2023</a:t>
             </a:fld>
             <a:endParaRPr lang="en-US" dirty="0"/>
           </a:p>
@@ -763,7 +763,7 @@
           <a:p>
             <a:fld id="{C26389DF-7C87-4F65-9868-559F2AC6CA20}" type="datetimeFigureOut">
               <a:rPr lang="en-US" smtClean="0"/>
-              <a:t>5/15/2023</a:t>
+              <a:t>10/4/2023</a:t>
             </a:fld>
             <a:endParaRPr lang="en-US" dirty="0"/>
           </a:p>
@@ -1009,7 +1009,7 @@
           <a:p>
             <a:fld id="{C26389DF-7C87-4F65-9868-559F2AC6CA20}" type="datetimeFigureOut">
               <a:rPr lang="en-US" smtClean="0"/>
-              <a:t>5/15/2023</a:t>
+              <a:t>10/4/2023</a:t>
             </a:fld>
             <a:endParaRPr lang="en-US" dirty="0"/>
           </a:p>
@@ -1241,7 +1241,7 @@
           <a:p>
             <a:fld id="{C26389DF-7C87-4F65-9868-559F2AC6CA20}" type="datetimeFigureOut">
               <a:rPr lang="en-US" smtClean="0"/>
-              <a:t>5/15/2023</a:t>
+              <a:t>10/4/2023</a:t>
             </a:fld>
             <a:endParaRPr lang="en-US" dirty="0"/>
           </a:p>
@@ -1608,7 +1608,7 @@
           <a:p>
             <a:fld id="{C26389DF-7C87-4F65-9868-559F2AC6CA20}" type="datetimeFigureOut">
               <a:rPr lang="en-US" smtClean="0"/>
-              <a:t>5/15/2023</a:t>
+              <a:t>10/4/2023</a:t>
             </a:fld>
             <a:endParaRPr lang="en-US" dirty="0"/>
           </a:p>
@@ -1726,7 +1726,7 @@
           <a:p>
             <a:fld id="{C26389DF-7C87-4F65-9868-559F2AC6CA20}" type="datetimeFigureOut">
               <a:rPr lang="en-US" smtClean="0"/>
-              <a:t>5/15/2023</a:t>
+              <a:t>10/4/2023</a:t>
             </a:fld>
             <a:endParaRPr lang="en-US" dirty="0"/>
           </a:p>
@@ -1821,7 +1821,7 @@
           <a:p>
             <a:fld id="{C26389DF-7C87-4F65-9868-559F2AC6CA20}" type="datetimeFigureOut">
               <a:rPr lang="en-US" smtClean="0"/>
-              <a:t>5/15/2023</a:t>
+              <a:t>10/4/2023</a:t>
             </a:fld>
             <a:endParaRPr lang="en-US" dirty="0"/>
           </a:p>
@@ -2098,7 +2098,7 @@
           <a:p>
             <a:fld id="{C26389DF-7C87-4F65-9868-559F2AC6CA20}" type="datetimeFigureOut">
               <a:rPr lang="en-US" smtClean="0"/>
-              <a:t>5/15/2023</a:t>
+              <a:t>10/4/2023</a:t>
             </a:fld>
             <a:endParaRPr lang="en-US" dirty="0"/>
           </a:p>
@@ -2354,7 +2354,7 @@
           <a:p>
             <a:fld id="{C26389DF-7C87-4F65-9868-559F2AC6CA20}" type="datetimeFigureOut">
               <a:rPr lang="en-US" smtClean="0"/>
-              <a:t>5/15/2023</a:t>
+              <a:t>10/4/2023</a:t>
             </a:fld>
             <a:endParaRPr lang="en-US" dirty="0"/>
           </a:p>
@@ -2567,7 +2567,7 @@
           <a:p>
             <a:fld id="{C26389DF-7C87-4F65-9868-559F2AC6CA20}" type="datetimeFigureOut">
               <a:rPr lang="en-US" smtClean="0"/>
-              <a:t>5/15/2023</a:t>
+              <a:t>10/4/2023</a:t>
             </a:fld>
             <a:endParaRPr lang="en-US" dirty="0"/>
           </a:p>
@@ -3681,6 +3681,18 @@
               </a:rPr>
               <a:t>Sensing</a:t>
             </a:r>
+            <a:r>
+              <a:rPr lang="de-DE" sz="800" dirty="0">
+                <a:solidFill>
+                  <a:schemeClr val="accent1">
+                    <a:lumMod val="75000"/>
+                  </a:schemeClr>
+                </a:solidFill>
+                <a:latin typeface="Times New Roman" panose="02020603050405020304" pitchFamily="18" charset="0"/>
+                <a:cs typeface="Times New Roman" panose="02020603050405020304" pitchFamily="18" charset="0"/>
+              </a:rPr>
+              <a:t>,</a:t>
+            </a:r>
             <a:endParaRPr lang="en-US" sz="800" dirty="0">
               <a:solidFill>
                 <a:schemeClr val="accent1">
@@ -4058,7 +4070,7 @@
                 <a:latin typeface="Times New Roman" panose="02020603050405020304" pitchFamily="18" charset="0"/>
                 <a:cs typeface="Times New Roman" panose="02020603050405020304" pitchFamily="18" charset="0"/>
               </a:rPr>
-              <a:t>Filter relevant areas areas; </a:t>
+              <a:t>Filter relevant areas; </a:t>
             </a:r>
             <a:br>
               <a:rPr lang="en-US" sz="800" dirty="0">

</xml_diff>

<commit_message>
refactor acronyms in figures
</commit_message>
<xml_diff>
--- a/img/taxonomy_with_oracle.pptx
+++ b/img/taxonomy_with_oracle.pptx
@@ -243,7 +243,7 @@
           <a:p>
             <a:fld id="{C26389DF-7C87-4F65-9868-559F2AC6CA20}" type="datetimeFigureOut">
               <a:rPr lang="en-US" smtClean="0"/>
-              <a:t>10/4/2023</a:t>
+              <a:t>6/10/2024</a:t>
             </a:fld>
             <a:endParaRPr lang="en-US" dirty="0"/>
           </a:p>
@@ -413,7 +413,7 @@
           <a:p>
             <a:fld id="{C26389DF-7C87-4F65-9868-559F2AC6CA20}" type="datetimeFigureOut">
               <a:rPr lang="en-US" smtClean="0"/>
-              <a:t>10/4/2023</a:t>
+              <a:t>6/10/2024</a:t>
             </a:fld>
             <a:endParaRPr lang="en-US" dirty="0"/>
           </a:p>
@@ -593,7 +593,7 @@
           <a:p>
             <a:fld id="{C26389DF-7C87-4F65-9868-559F2AC6CA20}" type="datetimeFigureOut">
               <a:rPr lang="en-US" smtClean="0"/>
-              <a:t>10/4/2023</a:t>
+              <a:t>6/10/2024</a:t>
             </a:fld>
             <a:endParaRPr lang="en-US" dirty="0"/>
           </a:p>
@@ -763,7 +763,7 @@
           <a:p>
             <a:fld id="{C26389DF-7C87-4F65-9868-559F2AC6CA20}" type="datetimeFigureOut">
               <a:rPr lang="en-US" smtClean="0"/>
-              <a:t>10/4/2023</a:t>
+              <a:t>6/10/2024</a:t>
             </a:fld>
             <a:endParaRPr lang="en-US" dirty="0"/>
           </a:p>
@@ -1009,7 +1009,7 @@
           <a:p>
             <a:fld id="{C26389DF-7C87-4F65-9868-559F2AC6CA20}" type="datetimeFigureOut">
               <a:rPr lang="en-US" smtClean="0"/>
-              <a:t>10/4/2023</a:t>
+              <a:t>6/10/2024</a:t>
             </a:fld>
             <a:endParaRPr lang="en-US" dirty="0"/>
           </a:p>
@@ -1241,7 +1241,7 @@
           <a:p>
             <a:fld id="{C26389DF-7C87-4F65-9868-559F2AC6CA20}" type="datetimeFigureOut">
               <a:rPr lang="en-US" smtClean="0"/>
-              <a:t>10/4/2023</a:t>
+              <a:t>6/10/2024</a:t>
             </a:fld>
             <a:endParaRPr lang="en-US" dirty="0"/>
           </a:p>
@@ -1608,7 +1608,7 @@
           <a:p>
             <a:fld id="{C26389DF-7C87-4F65-9868-559F2AC6CA20}" type="datetimeFigureOut">
               <a:rPr lang="en-US" smtClean="0"/>
-              <a:t>10/4/2023</a:t>
+              <a:t>6/10/2024</a:t>
             </a:fld>
             <a:endParaRPr lang="en-US" dirty="0"/>
           </a:p>
@@ -1726,7 +1726,7 @@
           <a:p>
             <a:fld id="{C26389DF-7C87-4F65-9868-559F2AC6CA20}" type="datetimeFigureOut">
               <a:rPr lang="en-US" smtClean="0"/>
-              <a:t>10/4/2023</a:t>
+              <a:t>6/10/2024</a:t>
             </a:fld>
             <a:endParaRPr lang="en-US" dirty="0"/>
           </a:p>
@@ -1821,7 +1821,7 @@
           <a:p>
             <a:fld id="{C26389DF-7C87-4F65-9868-559F2AC6CA20}" type="datetimeFigureOut">
               <a:rPr lang="en-US" smtClean="0"/>
-              <a:t>10/4/2023</a:t>
+              <a:t>6/10/2024</a:t>
             </a:fld>
             <a:endParaRPr lang="en-US" dirty="0"/>
           </a:p>
@@ -2098,7 +2098,7 @@
           <a:p>
             <a:fld id="{C26389DF-7C87-4F65-9868-559F2AC6CA20}" type="datetimeFigureOut">
               <a:rPr lang="en-US" smtClean="0"/>
-              <a:t>10/4/2023</a:t>
+              <a:t>6/10/2024</a:t>
             </a:fld>
             <a:endParaRPr lang="en-US" dirty="0"/>
           </a:p>
@@ -2354,7 +2354,7 @@
           <a:p>
             <a:fld id="{C26389DF-7C87-4F65-9868-559F2AC6CA20}" type="datetimeFigureOut">
               <a:rPr lang="en-US" smtClean="0"/>
-              <a:t>10/4/2023</a:t>
+              <a:t>6/10/2024</a:t>
             </a:fld>
             <a:endParaRPr lang="en-US" dirty="0"/>
           </a:p>
@@ -2567,7 +2567,7 @@
           <a:p>
             <a:fld id="{C26389DF-7C87-4F65-9868-559F2AC6CA20}" type="datetimeFigureOut">
               <a:rPr lang="en-US" smtClean="0"/>
-              <a:t>10/4/2023</a:t>
+              <a:t>6/10/2024</a:t>
             </a:fld>
             <a:endParaRPr lang="en-US" dirty="0"/>
           </a:p>
@@ -3563,7 +3563,7 @@
         </p:nvSpPr>
         <p:spPr>
           <a:xfrm>
-            <a:off x="435032" y="702908"/>
+            <a:off x="400035" y="671423"/>
             <a:ext cx="401934" cy="215444"/>
           </a:xfrm>
           <a:prstGeom prst="rect">
@@ -3578,7 +3578,7 @@
           <a:lstStyle/>
           <a:p>
             <a:r>
-              <a:rPr lang="de-DE" sz="800" dirty="0" err="1">
+              <a:rPr lang="de-DE" sz="800" dirty="0">
                 <a:solidFill>
                   <a:schemeClr val="accent1">
                     <a:lumMod val="75000"/>
@@ -3587,7 +3587,53 @@
                 <a:latin typeface="Times New Roman" panose="02020603050405020304" pitchFamily="18" charset="0"/>
                 <a:cs typeface="Times New Roman" panose="02020603050405020304" pitchFamily="18" charset="0"/>
               </a:rPr>
-              <a:t>FoV</a:t>
+              <a:t>Area</a:t>
+            </a:r>
+            <a:br>
+              <a:rPr lang="de-DE" sz="800" dirty="0">
+                <a:solidFill>
+                  <a:schemeClr val="accent1">
+                    <a:lumMod val="75000"/>
+                  </a:schemeClr>
+                </a:solidFill>
+                <a:latin typeface="Times New Roman" panose="02020603050405020304" pitchFamily="18" charset="0"/>
+                <a:cs typeface="Times New Roman" panose="02020603050405020304" pitchFamily="18" charset="0"/>
+              </a:rPr>
+            </a:br>
+            <a:r>
+              <a:rPr lang="de-DE" sz="800" dirty="0" err="1">
+                <a:solidFill>
+                  <a:schemeClr val="accent1">
+                    <a:lumMod val="75000"/>
+                  </a:schemeClr>
+                </a:solidFill>
+                <a:latin typeface="Times New Roman" panose="02020603050405020304" pitchFamily="18" charset="0"/>
+                <a:cs typeface="Times New Roman" panose="02020603050405020304" pitchFamily="18" charset="0"/>
+              </a:rPr>
+              <a:t>of</a:t>
+            </a:r>
+            <a:br>
+              <a:rPr lang="de-DE" sz="800" dirty="0">
+                <a:solidFill>
+                  <a:schemeClr val="accent1">
+                    <a:lumMod val="75000"/>
+                  </a:schemeClr>
+                </a:solidFill>
+                <a:latin typeface="Times New Roman" panose="02020603050405020304" pitchFamily="18" charset="0"/>
+                <a:cs typeface="Times New Roman" panose="02020603050405020304" pitchFamily="18" charset="0"/>
+              </a:rPr>
+            </a:br>
+            <a:r>
+              <a:rPr lang="de-DE" sz="800" dirty="0" err="1">
+                <a:solidFill>
+                  <a:schemeClr val="accent1">
+                    <a:lumMod val="75000"/>
+                  </a:schemeClr>
+                </a:solidFill>
+                <a:latin typeface="Times New Roman" panose="02020603050405020304" pitchFamily="18" charset="0"/>
+                <a:cs typeface="Times New Roman" panose="02020603050405020304" pitchFamily="18" charset="0"/>
+              </a:rPr>
+              <a:t>vision</a:t>
             </a:r>
             <a:endParaRPr lang="en-US" sz="800" dirty="0">
               <a:solidFill>
@@ -4567,21 +4613,19 @@
                 <a:latin typeface="Times New Roman" panose="02020603050405020304" pitchFamily="18" charset="0"/>
                 <a:cs typeface="Times New Roman" panose="02020603050405020304" pitchFamily="18" charset="0"/>
               </a:rPr>
-              <a:t>Potential</a:t>
-            </a:r>
-            <a:br>
-              <a:rPr lang="en-US" sz="999" dirty="0">
-                <a:latin typeface="Times New Roman" panose="02020603050405020304" pitchFamily="18" charset="0"/>
-                <a:cs typeface="Times New Roman" panose="02020603050405020304" pitchFamily="18" charset="0"/>
-              </a:rPr>
-            </a:br>
-            <a:r>
-              <a:rPr lang="en-US" sz="999" dirty="0">
-                <a:latin typeface="Times New Roman" panose="02020603050405020304" pitchFamily="18" charset="0"/>
-                <a:cs typeface="Times New Roman" panose="02020603050405020304" pitchFamily="18" charset="0"/>
-              </a:rPr>
-              <a:t>further evaluation</a:t>
-            </a:r>
+              <a:t>Further metrics </a:t>
+            </a:r>
+            <a:r>
+              <a:rPr lang="en-US" sz="999">
+                <a:latin typeface="Times New Roman" panose="02020603050405020304" pitchFamily="18" charset="0"/>
+                <a:cs typeface="Times New Roman" panose="02020603050405020304" pitchFamily="18" charset="0"/>
+              </a:rPr>
+              <a:t>&amp; criteria</a:t>
+            </a:r>
+            <a:endParaRPr lang="en-US" sz="999" dirty="0">
+              <a:latin typeface="Times New Roman" panose="02020603050405020304" pitchFamily="18" charset="0"/>
+              <a:cs typeface="Times New Roman" panose="02020603050405020304" pitchFamily="18" charset="0"/>
+            </a:endParaRPr>
           </a:p>
         </p:txBody>
       </p:sp>

</xml_diff>